<commit_message>
reFormatting the functions and downloading the data
</commit_message>
<xml_diff>
--- a/presentation/Trading Sentiment Analysis in Decentralized Cryptocurrencies.pptx
+++ b/presentation/Trading Sentiment Analysis in Decentralized Cryptocurrencies.pptx
@@ -970,6 +970,90 @@
           <a:bodyPr/>
           <a:lstStyle/>
           <a:p>
+            <a:endParaRPr lang="en-IL" dirty="0"/>
+          </a:p>
+        </p:txBody>
+      </p:sp>
+      <p:sp>
+        <p:nvSpPr>
+          <p:cNvPr id="4" name="Slide Number Placeholder 3"/>
+          <p:cNvSpPr>
+            <a:spLocks noGrp="1"/>
+          </p:cNvSpPr>
+          <p:nvPr>
+            <p:ph type="sldNum" sz="quarter" idx="5"/>
+          </p:nvPr>
+        </p:nvSpPr>
+        <p:spPr/>
+        <p:txBody>
+          <a:bodyPr/>
+          <a:lstStyle/>
+          <a:p>
+            <a:fld id="{22289C57-55D7-40A4-A101-E74FAC7A092B}" type="slidenum">
+              <a:rPr lang="en-US" smtClean="0"/>
+              <a:t>5</a:t>
+            </a:fld>
+            <a:endParaRPr lang="en-US" dirty="0"/>
+          </a:p>
+        </p:txBody>
+      </p:sp>
+    </p:spTree>
+    <p:extLst>
+      <p:ext uri="{BB962C8B-B14F-4D97-AF65-F5344CB8AC3E}">
+        <p14:creationId xmlns:p14="http://schemas.microsoft.com/office/powerpoint/2010/main" val="2527501854"/>
+      </p:ext>
+    </p:extLst>
+  </p:cSld>
+  <p:clrMapOvr>
+    <a:masterClrMapping/>
+  </p:clrMapOvr>
+</p:notes>
+</file>
+
+<file path=ppt/notesSlides/notesSlide5.xml><?xml version="1.0" encoding="utf-8"?>
+<p:notes xmlns:a="http://schemas.openxmlformats.org/drawingml/2006/main" xmlns:r="http://schemas.openxmlformats.org/officeDocument/2006/relationships" xmlns:p="http://schemas.openxmlformats.org/presentationml/2006/main">
+  <p:cSld>
+    <p:spTree>
+      <p:nvGrpSpPr>
+        <p:cNvPr id="1" name=""/>
+        <p:cNvGrpSpPr/>
+        <p:nvPr/>
+      </p:nvGrpSpPr>
+      <p:grpSpPr>
+        <a:xfrm>
+          <a:off x="0" y="0"/>
+          <a:ext cx="0" cy="0"/>
+          <a:chOff x="0" y="0"/>
+          <a:chExt cx="0" cy="0"/>
+        </a:xfrm>
+      </p:grpSpPr>
+      <p:sp>
+        <p:nvSpPr>
+          <p:cNvPr id="2" name="Slide Image Placeholder 1"/>
+          <p:cNvSpPr>
+            <a:spLocks noGrp="1" noRot="1" noChangeAspect="1"/>
+          </p:cNvSpPr>
+          <p:nvPr>
+            <p:ph type="sldImg"/>
+          </p:nvPr>
+        </p:nvSpPr>
+        <p:spPr/>
+      </p:sp>
+      <p:sp>
+        <p:nvSpPr>
+          <p:cNvPr id="3" name="Notes Placeholder 2"/>
+          <p:cNvSpPr>
+            <a:spLocks noGrp="1"/>
+          </p:cNvSpPr>
+          <p:nvPr>
+            <p:ph type="body" idx="1"/>
+          </p:nvPr>
+        </p:nvSpPr>
+        <p:spPr/>
+        <p:txBody>
+          <a:bodyPr/>
+          <a:lstStyle/>
+          <a:p>
             <a:endParaRPr lang="en-US" dirty="0"/>
           </a:p>
         </p:txBody>
@@ -1010,7 +1094,7 @@
 </p:notes>
 </file>
 
-<file path=ppt/notesSlides/notesSlide5.xml><?xml version="1.0" encoding="utf-8"?>
+<file path=ppt/notesSlides/notesSlide6.xml><?xml version="1.0" encoding="utf-8"?>
 <p:notes xmlns:a="http://schemas.openxmlformats.org/drawingml/2006/main" xmlns:r="http://schemas.openxmlformats.org/officeDocument/2006/relationships" xmlns:p="http://schemas.openxmlformats.org/presentationml/2006/main">
   <p:cSld>
     <p:spTree>
@@ -6771,7 +6855,7 @@
         <p:spPr>
           <a:xfrm>
             <a:off x="7106115" y="2184969"/>
-            <a:ext cx="6094140" cy="2538452"/>
+            <a:ext cx="6094140" cy="1707455"/>
           </a:xfrm>
           <a:prstGeom prst="rect">
             <a:avLst/>
@@ -6805,42 +6889,6 @@
                 <a:hlinkClick r:id="rId3"/>
               </a:rPr>
               <a:t>https://trends.google.com/trends?geo=VI&amp;hl=en-US</a:t>
-            </a:r>
-            <a:endParaRPr lang="en-US" dirty="0">
-              <a:solidFill>
-                <a:schemeClr val="bg1"/>
-              </a:solidFill>
-            </a:endParaRPr>
-          </a:p>
-          <a:p>
-            <a:pPr>
-              <a:lnSpc>
-                <a:spcPct val="150000"/>
-              </a:lnSpc>
-            </a:pPr>
-            <a:r>
-              <a:rPr lang="en-US" dirty="0">
-                <a:solidFill>
-                  <a:schemeClr val="bg1"/>
-                </a:solidFill>
-              </a:rPr>
-              <a:t>GPT-4o</a:t>
-            </a:r>
-          </a:p>
-          <a:p>
-            <a:pPr>
-              <a:lnSpc>
-                <a:spcPct val="150000"/>
-              </a:lnSpc>
-            </a:pPr>
-            <a:r>
-              <a:rPr lang="en-US" dirty="0">
-                <a:solidFill>
-                  <a:schemeClr val="bg1"/>
-                </a:solidFill>
-                <a:hlinkClick r:id="rId4"/>
-              </a:rPr>
-              <a:t>https://chatgpt.com/</a:t>
             </a:r>
             <a:endParaRPr lang="en-US" dirty="0">
               <a:solidFill>
@@ -6985,10 +7033,10 @@
       </p:sp>
       <p:grpSp>
         <p:nvGrpSpPr>
-          <p:cNvPr id="19" name="Group 18">
-            <a:extLst>
-              <a:ext uri="{FF2B5EF4-FFF2-40B4-BE49-F238E27FC236}">
-                <a16:creationId xmlns:a16="http://schemas.microsoft.com/office/drawing/2014/main" id="{D244C8A9-E3BD-4F79-60DE-86C6632EB59E}"/>
+          <p:cNvPr id="41" name="Group 40">
+            <a:extLst>
+              <a:ext uri="{FF2B5EF4-FFF2-40B4-BE49-F238E27FC236}">
+                <a16:creationId xmlns:a16="http://schemas.microsoft.com/office/drawing/2014/main" id="{D8B61F5A-9D8F-6419-7731-A29D1D40374E}"/>
               </a:ext>
             </a:extLst>
           </p:cNvPr>
@@ -6997,18 +7045,18 @@
         </p:nvGrpSpPr>
         <p:grpSpPr>
           <a:xfrm>
-            <a:off x="1322388" y="1485161"/>
-            <a:ext cx="9547200" cy="4561200"/>
-            <a:chOff x="3538331" y="1376733"/>
-            <a:chExt cx="8136942" cy="3887675"/>
+            <a:off x="1091768" y="1356853"/>
+            <a:ext cx="10008464" cy="4531885"/>
+            <a:chOff x="535704" y="1280753"/>
+            <a:chExt cx="11120515" cy="5035428"/>
           </a:xfrm>
         </p:grpSpPr>
         <p:pic>
           <p:nvPicPr>
-            <p:cNvPr id="12" name="Picture 11" descr="A graph of a graph of a graph of a graph of a graph of a graph of a graph of a graph of a graph of a graph of a graph of a graph of a graph of&#10;&#10;Description automatically generated">
+            <p:cNvPr id="34" name="Picture 33" descr="A graph of a graph of a graph of a graph of a graph of a graph of a graph of a graph of a graph of a graph of a graph of a graph of a graph of&#10;&#10;Description automatically generated">
               <a:extLst>
                 <a:ext uri="{FF2B5EF4-FFF2-40B4-BE49-F238E27FC236}">
-                  <a16:creationId xmlns:a16="http://schemas.microsoft.com/office/drawing/2014/main" id="{520E2D22-7C68-D813-B9D5-A6FFEAC23A93}"/>
+                  <a16:creationId xmlns:a16="http://schemas.microsoft.com/office/drawing/2014/main" id="{2E420926-ADAB-CB96-8A2A-B430D0E03CD5}"/>
                 </a:ext>
               </a:extLst>
             </p:cNvPr>
@@ -7017,15 +7065,16 @@
             </p:cNvPicPr>
             <p:nvPr/>
           </p:nvPicPr>
-          <p:blipFill rotWithShape="1">
+          <p:blipFill>
             <a:blip r:embed="rId2"/>
-            <a:srcRect t="1" b="1120"/>
-            <a:stretch/>
+            <a:stretch>
+              <a:fillRect/>
+            </a:stretch>
           </p:blipFill>
           <p:spPr>
             <a:xfrm>
-              <a:off x="7606747" y="3331507"/>
-              <a:ext cx="4068526" cy="1932901"/>
+              <a:off x="6095358" y="3798467"/>
+              <a:ext cx="5559654" cy="2517714"/>
             </a:xfrm>
             <a:prstGeom prst="rect">
               <a:avLst/>
@@ -7034,10 +7083,10 @@
         </p:pic>
         <p:pic>
           <p:nvPicPr>
-            <p:cNvPr id="18" name="Picture 17" descr="A graph of a graph of a graph&#10;&#10;Description automatically generated with medium confidence">
+            <p:cNvPr id="36" name="Picture 35" descr="A graph of a stock market&#10;&#10;Description automatically generated">
               <a:extLst>
                 <a:ext uri="{FF2B5EF4-FFF2-40B4-BE49-F238E27FC236}">
-                  <a16:creationId xmlns:a16="http://schemas.microsoft.com/office/drawing/2014/main" id="{08C7A08E-251A-A84B-C305-A2A92D9B56E3}"/>
+                  <a16:creationId xmlns:a16="http://schemas.microsoft.com/office/drawing/2014/main" id="{48530117-3ADA-8141-3B2B-65157A4B0BC8}"/>
                 </a:ext>
               </a:extLst>
             </p:cNvPr>
@@ -7054,8 +7103,8 @@
           </p:blipFill>
           <p:spPr>
             <a:xfrm>
-              <a:off x="3538331" y="3331507"/>
-              <a:ext cx="4068000" cy="1932901"/>
+              <a:off x="535704" y="3798467"/>
+              <a:ext cx="5559654" cy="2517714"/>
             </a:xfrm>
             <a:prstGeom prst="rect">
               <a:avLst/>
@@ -7064,10 +7113,10 @@
         </p:pic>
         <p:pic>
           <p:nvPicPr>
-            <p:cNvPr id="16" name="Picture 15" descr="A green line graph with black lines&#10;&#10;Description automatically generated">
+            <p:cNvPr id="38" name="Picture 37" descr="A graph of a graph of a graph&#10;&#10;Description automatically generated with medium confidence">
               <a:extLst>
                 <a:ext uri="{FF2B5EF4-FFF2-40B4-BE49-F238E27FC236}">
-                  <a16:creationId xmlns:a16="http://schemas.microsoft.com/office/drawing/2014/main" id="{94B8DD89-5D78-9BE3-CCF3-0B0530717294}"/>
+                  <a16:creationId xmlns:a16="http://schemas.microsoft.com/office/drawing/2014/main" id="{FC9713DE-1C93-81A9-C07D-83622ACEA581}"/>
                 </a:ext>
               </a:extLst>
             </p:cNvPr>
@@ -7084,8 +7133,8 @@
           </p:blipFill>
           <p:spPr>
             <a:xfrm>
-              <a:off x="7606747" y="1376733"/>
-              <a:ext cx="4068526" cy="1954800"/>
+              <a:off x="6096565" y="1280753"/>
+              <a:ext cx="5559654" cy="2517714"/>
             </a:xfrm>
             <a:prstGeom prst="rect">
               <a:avLst/>
@@ -7094,10 +7143,10 @@
         </p:pic>
         <p:pic>
           <p:nvPicPr>
-            <p:cNvPr id="8" name="Picture 7" descr="A graph of a stock market&#10;&#10;Description automatically generated with medium confidence">
+            <p:cNvPr id="40" name="Picture 39" descr="A graph of a graph of a graph&#10;&#10;Description automatically generated with medium confidence">
               <a:extLst>
                 <a:ext uri="{FF2B5EF4-FFF2-40B4-BE49-F238E27FC236}">
-                  <a16:creationId xmlns:a16="http://schemas.microsoft.com/office/drawing/2014/main" id="{5351975E-7897-1759-97A9-B182D73D5C10}"/>
+                  <a16:creationId xmlns:a16="http://schemas.microsoft.com/office/drawing/2014/main" id="{FD84B969-35B8-9B1E-75F5-7F2020842839}"/>
                 </a:ext>
               </a:extLst>
             </p:cNvPr>
@@ -7114,8 +7163,8 @@
           </p:blipFill>
           <p:spPr>
             <a:xfrm>
-              <a:off x="3538331" y="1376759"/>
-              <a:ext cx="4068417" cy="1954748"/>
+              <a:off x="535781" y="1280755"/>
+              <a:ext cx="5559654" cy="2517714"/>
             </a:xfrm>
             <a:prstGeom prst="rect">
               <a:avLst/>
@@ -7291,14 +7340,14 @@
           <p:nvPr/>
         </p:nvPicPr>
         <p:blipFill>
-          <a:blip r:embed="rId2"/>
+          <a:blip r:embed="rId3"/>
           <a:srcRect/>
           <a:stretch/>
         </p:blipFill>
         <p:spPr>
           <a:xfrm>
-            <a:off x="3540982" y="1245778"/>
-            <a:ext cx="7520718" cy="3613469"/>
+            <a:off x="3687872" y="1245778"/>
+            <a:ext cx="7226937" cy="3613469"/>
           </a:xfrm>
           <a:prstGeom prst="rect">
             <a:avLst/>
@@ -7531,31 +7580,6 @@
               <a:rPr lang="en-US" sz="4800" dirty="0"/>
               <a:t>Any question?</a:t>
             </a:r>
-          </a:p>
-        </p:txBody>
-      </p:sp>
-      <p:sp>
-        <p:nvSpPr>
-          <p:cNvPr id="3" name="Subtitle 2">
-            <a:extLst>
-              <a:ext uri="{FF2B5EF4-FFF2-40B4-BE49-F238E27FC236}">
-                <a16:creationId xmlns:a16="http://schemas.microsoft.com/office/drawing/2014/main" id="{F1234A9B-86B8-A11C-796A-A520888C727B}"/>
-              </a:ext>
-            </a:extLst>
-          </p:cNvPr>
-          <p:cNvSpPr>
-            <a:spLocks noGrp="1"/>
-          </p:cNvSpPr>
-          <p:nvPr>
-            <p:ph type="subTitle" idx="1"/>
-          </p:nvPr>
-        </p:nvSpPr>
-        <p:spPr/>
-        <p:txBody>
-          <a:bodyPr/>
-          <a:lstStyle/>
-          <a:p>
-            <a:endParaRPr lang="en-IL"/>
           </a:p>
         </p:txBody>
       </p:sp>

</xml_diff>

<commit_message>
updated presentation so far
</commit_message>
<xml_diff>
--- a/presentation/Trading Sentiment Analysis in Decentralized Cryptocurrencies.pptx
+++ b/presentation/Trading Sentiment Analysis in Decentralized Cryptocurrencies.pptx
@@ -5,10 +5,10 @@
     <p:sldMasterId id="2147483648" r:id="rId4"/>
   </p:sldMasterIdLst>
   <p:notesMasterIdLst>
-    <p:notesMasterId r:id="rId12"/>
+    <p:notesMasterId r:id="rId16"/>
   </p:notesMasterIdLst>
   <p:handoutMasterIdLst>
-    <p:handoutMasterId r:id="rId13"/>
+    <p:handoutMasterId r:id="rId17"/>
   </p:handoutMasterIdLst>
   <p:sldIdLst>
     <p:sldId id="256" r:id="rId5"/>
@@ -17,7 +17,11 @@
     <p:sldId id="286" r:id="rId8"/>
     <p:sldId id="282" r:id="rId9"/>
     <p:sldId id="258" r:id="rId10"/>
-    <p:sldId id="281" r:id="rId11"/>
+    <p:sldId id="287" r:id="rId11"/>
+    <p:sldId id="288" r:id="rId12"/>
+    <p:sldId id="290" r:id="rId13"/>
+    <p:sldId id="289" r:id="rId14"/>
+    <p:sldId id="281" r:id="rId15"/>
   </p:sldIdLst>
   <p:sldSz cx="12192000" cy="6858000"/>
   <p:notesSz cx="6858000" cy="9144000"/>
@@ -227,7 +231,7 @@
           <a:p>
             <a:fld id="{B56F32FC-4BD9-442A-A8C6-51598C909FE3}" type="datetimeFigureOut">
               <a:rPr lang="en-US" smtClean="0"/>
-              <a:t>6/19/2024</a:t>
+              <a:t>7/14/2024</a:t>
             </a:fld>
             <a:endParaRPr lang="en-US" dirty="0"/>
           </a:p>
@@ -404,7 +408,7 @@
           <a:p>
             <a:fld id="{056371FA-A98D-41E8-93F4-09945841298A}" type="datetimeFigureOut">
               <a:rPr lang="en-US" smtClean="0"/>
-              <a:t>6/19/2024</a:t>
+              <a:t>7/14/2024</a:t>
             </a:fld>
             <a:endParaRPr lang="en-US" dirty="0"/>
           </a:p>
@@ -970,6 +974,14 @@
           <a:bodyPr/>
           <a:lstStyle/>
           <a:p>
+            <a:r>
+              <a:rPr lang="en-US" dirty="0"/>
+              <a:t>Remove</a:t>
+            </a:r>
+            <a:r>
+              <a:rPr lang="he-IL" dirty="0"/>
+              <a:t>?</a:t>
+            </a:r>
             <a:endParaRPr lang="en-IL" dirty="0"/>
           </a:p>
         </p:txBody>
@@ -991,7 +1003,7 @@
           <a:p>
             <a:fld id="{22289C57-55D7-40A4-A101-E74FAC7A092B}" type="slidenum">
               <a:rPr lang="en-US" smtClean="0"/>
-              <a:t>5</a:t>
+              <a:t>4</a:t>
             </a:fld>
             <a:endParaRPr lang="en-US" dirty="0"/>
           </a:p>
@@ -1000,7 +1012,7 @@
     </p:spTree>
     <p:extLst>
       <p:ext uri="{BB962C8B-B14F-4D97-AF65-F5344CB8AC3E}">
-        <p14:creationId xmlns:p14="http://schemas.microsoft.com/office/powerpoint/2010/main" val="2527501854"/>
+        <p14:creationId xmlns:p14="http://schemas.microsoft.com/office/powerpoint/2010/main" val="292293935"/>
       </p:ext>
     </p:extLst>
   </p:cSld>
@@ -1054,7 +1066,10 @@
           <a:bodyPr/>
           <a:lstStyle/>
           <a:p>
-            <a:endParaRPr lang="en-US" dirty="0"/>
+            <a:r>
+              <a:rPr lang="en-US" dirty="0"/>
+              <a:t>Remove?</a:t>
+            </a:r>
           </a:p>
         </p:txBody>
       </p:sp>
@@ -1075,7 +1090,7 @@
           <a:p>
             <a:fld id="{22289C57-55D7-40A4-A101-E74FAC7A092B}" type="slidenum">
               <a:rPr lang="en-US" smtClean="0"/>
-              <a:t>6</a:t>
+              <a:t>5</a:t>
             </a:fld>
             <a:endParaRPr lang="en-US" dirty="0"/>
           </a:p>
@@ -1084,7 +1099,7 @@
     </p:spTree>
     <p:extLst>
       <p:ext uri="{BB962C8B-B14F-4D97-AF65-F5344CB8AC3E}">
-        <p14:creationId xmlns:p14="http://schemas.microsoft.com/office/powerpoint/2010/main" val="2843954456"/>
+        <p14:creationId xmlns:p14="http://schemas.microsoft.com/office/powerpoint/2010/main" val="2527501854"/>
       </p:ext>
     </p:extLst>
   </p:cSld>
@@ -1159,7 +1174,91 @@
           <a:p>
             <a:fld id="{22289C57-55D7-40A4-A101-E74FAC7A092B}" type="slidenum">
               <a:rPr lang="en-US" smtClean="0"/>
-              <a:t>7</a:t>
+              <a:t>6</a:t>
+            </a:fld>
+            <a:endParaRPr lang="en-US" dirty="0"/>
+          </a:p>
+        </p:txBody>
+      </p:sp>
+    </p:spTree>
+    <p:extLst>
+      <p:ext uri="{BB962C8B-B14F-4D97-AF65-F5344CB8AC3E}">
+        <p14:creationId xmlns:p14="http://schemas.microsoft.com/office/powerpoint/2010/main" val="2843954456"/>
+      </p:ext>
+    </p:extLst>
+  </p:cSld>
+  <p:clrMapOvr>
+    <a:masterClrMapping/>
+  </p:clrMapOvr>
+</p:notes>
+</file>
+
+<file path=ppt/notesSlides/notesSlide7.xml><?xml version="1.0" encoding="utf-8"?>
+<p:notes xmlns:a="http://schemas.openxmlformats.org/drawingml/2006/main" xmlns:r="http://schemas.openxmlformats.org/officeDocument/2006/relationships" xmlns:p="http://schemas.openxmlformats.org/presentationml/2006/main">
+  <p:cSld>
+    <p:spTree>
+      <p:nvGrpSpPr>
+        <p:cNvPr id="1" name=""/>
+        <p:cNvGrpSpPr/>
+        <p:nvPr/>
+      </p:nvGrpSpPr>
+      <p:grpSpPr>
+        <a:xfrm>
+          <a:off x="0" y="0"/>
+          <a:ext cx="0" cy="0"/>
+          <a:chOff x="0" y="0"/>
+          <a:chExt cx="0" cy="0"/>
+        </a:xfrm>
+      </p:grpSpPr>
+      <p:sp>
+        <p:nvSpPr>
+          <p:cNvPr id="2" name="Slide Image Placeholder 1"/>
+          <p:cNvSpPr>
+            <a:spLocks noGrp="1" noRot="1" noChangeAspect="1"/>
+          </p:cNvSpPr>
+          <p:nvPr>
+            <p:ph type="sldImg"/>
+          </p:nvPr>
+        </p:nvSpPr>
+        <p:spPr/>
+      </p:sp>
+      <p:sp>
+        <p:nvSpPr>
+          <p:cNvPr id="3" name="Notes Placeholder 2"/>
+          <p:cNvSpPr>
+            <a:spLocks noGrp="1"/>
+          </p:cNvSpPr>
+          <p:nvPr>
+            <p:ph type="body" idx="1"/>
+          </p:nvPr>
+        </p:nvSpPr>
+        <p:spPr/>
+        <p:txBody>
+          <a:bodyPr/>
+          <a:lstStyle/>
+          <a:p>
+            <a:endParaRPr lang="en-US" dirty="0"/>
+          </a:p>
+        </p:txBody>
+      </p:sp>
+      <p:sp>
+        <p:nvSpPr>
+          <p:cNvPr id="4" name="Slide Number Placeholder 3"/>
+          <p:cNvSpPr>
+            <a:spLocks noGrp="1"/>
+          </p:cNvSpPr>
+          <p:nvPr>
+            <p:ph type="sldNum" sz="quarter" idx="5"/>
+          </p:nvPr>
+        </p:nvSpPr>
+        <p:spPr/>
+        <p:txBody>
+          <a:bodyPr/>
+          <a:lstStyle/>
+          <a:p>
+            <a:fld id="{22289C57-55D7-40A4-A101-E74FAC7A092B}" type="slidenum">
+              <a:rPr lang="en-US" smtClean="0"/>
+              <a:t>11</a:t>
             </a:fld>
             <a:endParaRPr lang="en-US" dirty="0"/>
           </a:p>
@@ -6568,7 +6667,7 @@
             <a:pPr algn="ctr"/>
             <a:r>
               <a:rPr lang="en-US" dirty="0"/>
-              <a:t> Trading Sentiment Analysis in Decentralized Cryptocurrencies</a:t>
+              <a:t> Google Trends as a Sentiment Indicator in Algorithmic Trading</a:t>
             </a:r>
           </a:p>
         </p:txBody>
@@ -6577,6 +6676,225 @@
     <p:extLst>
       <p:ext uri="{BB962C8B-B14F-4D97-AF65-F5344CB8AC3E}">
         <p14:creationId xmlns:p14="http://schemas.microsoft.com/office/powerpoint/2010/main" val="2586058810"/>
+      </p:ext>
+    </p:extLst>
+  </p:cSld>
+  <p:clrMapOvr>
+    <a:masterClrMapping/>
+  </p:clrMapOvr>
+</p:sld>
+</file>
+
+<file path=ppt/slides/slide10.xml><?xml version="1.0" encoding="utf-8"?>
+<p:sld xmlns:a="http://schemas.openxmlformats.org/drawingml/2006/main" xmlns:r="http://schemas.openxmlformats.org/officeDocument/2006/relationships" xmlns:p="http://schemas.openxmlformats.org/presentationml/2006/main">
+  <p:cSld>
+    <p:spTree>
+      <p:nvGrpSpPr>
+        <p:cNvPr id="1" name=""/>
+        <p:cNvGrpSpPr/>
+        <p:nvPr/>
+      </p:nvGrpSpPr>
+      <p:grpSpPr>
+        <a:xfrm>
+          <a:off x="0" y="0"/>
+          <a:ext cx="0" cy="0"/>
+          <a:chOff x="0" y="0"/>
+          <a:chExt cx="0" cy="0"/>
+        </a:xfrm>
+      </p:grpSpPr>
+      <p:sp>
+        <p:nvSpPr>
+          <p:cNvPr id="2" name="Title 1">
+            <a:extLst>
+              <a:ext uri="{FF2B5EF4-FFF2-40B4-BE49-F238E27FC236}">
+                <a16:creationId xmlns:a16="http://schemas.microsoft.com/office/drawing/2014/main" id="{8DB81D31-BB27-3E0E-C2FE-C56C467D033E}"/>
+              </a:ext>
+            </a:extLst>
+          </p:cNvPr>
+          <p:cNvSpPr>
+            <a:spLocks noGrp="1"/>
+          </p:cNvSpPr>
+          <p:nvPr>
+            <p:ph type="title"/>
+          </p:nvPr>
+        </p:nvSpPr>
+        <p:spPr>
+          <a:xfrm>
+            <a:off x="414543" y="669235"/>
+            <a:ext cx="3494848" cy="5519530"/>
+          </a:xfrm>
+        </p:spPr>
+        <p:txBody>
+          <a:bodyPr anchor="ctr"/>
+          <a:lstStyle/>
+          <a:p>
+            <a:pPr algn="ctr"/>
+            <a:r>
+              <a:rPr lang="en-US" sz="3600" dirty="0"/>
+              <a:t>results</a:t>
+            </a:r>
+            <a:endParaRPr lang="en-IL" dirty="0"/>
+          </a:p>
+        </p:txBody>
+      </p:sp>
+      <p:sp>
+        <p:nvSpPr>
+          <p:cNvPr id="4" name="Slide Number Placeholder 3">
+            <a:extLst>
+              <a:ext uri="{FF2B5EF4-FFF2-40B4-BE49-F238E27FC236}">
+                <a16:creationId xmlns:a16="http://schemas.microsoft.com/office/drawing/2014/main" id="{04A2575A-6EBD-45AB-82CB-85F9AB8CA985}"/>
+              </a:ext>
+            </a:extLst>
+          </p:cNvPr>
+          <p:cNvSpPr>
+            <a:spLocks noGrp="1"/>
+          </p:cNvSpPr>
+          <p:nvPr>
+            <p:ph type="sldNum" sz="quarter" idx="12"/>
+          </p:nvPr>
+        </p:nvSpPr>
+        <p:spPr/>
+        <p:txBody>
+          <a:bodyPr/>
+          <a:lstStyle/>
+          <a:p>
+            <a:fld id="{A49DFD55-3C28-40EF-9E31-A92D2E4017FF}" type="slidenum">
+              <a:rPr lang="en-US" smtClean="0"/>
+              <a:pPr/>
+              <a:t>10</a:t>
+            </a:fld>
+            <a:endParaRPr lang="en-US" dirty="0"/>
+          </a:p>
+        </p:txBody>
+      </p:sp>
+      <p:sp>
+        <p:nvSpPr>
+          <p:cNvPr id="5" name="Content Placeholder 4">
+            <a:extLst>
+              <a:ext uri="{FF2B5EF4-FFF2-40B4-BE49-F238E27FC236}">
+                <a16:creationId xmlns:a16="http://schemas.microsoft.com/office/drawing/2014/main" id="{B80861DE-AF85-FFF7-AC3C-52AEE0E916A5}"/>
+              </a:ext>
+            </a:extLst>
+          </p:cNvPr>
+          <p:cNvSpPr>
+            <a:spLocks noGrp="1"/>
+          </p:cNvSpPr>
+          <p:nvPr>
+            <p:ph sz="half" idx="14"/>
+          </p:nvPr>
+        </p:nvSpPr>
+        <p:spPr>
+          <a:xfrm>
+            <a:off x="5353878" y="669236"/>
+            <a:ext cx="6007023" cy="5519530"/>
+          </a:xfrm>
+        </p:spPr>
+        <p:txBody>
+          <a:bodyPr/>
+          <a:lstStyle/>
+          <a:p>
+            <a:r>
+              <a:rPr lang="en-US" dirty="0"/>
+              <a:t>Showcase results and discuss on them</a:t>
+            </a:r>
+            <a:endParaRPr lang="en-IL" dirty="0"/>
+          </a:p>
+        </p:txBody>
+      </p:sp>
+    </p:spTree>
+    <p:extLst>
+      <p:ext uri="{BB962C8B-B14F-4D97-AF65-F5344CB8AC3E}">
+        <p14:creationId xmlns:p14="http://schemas.microsoft.com/office/powerpoint/2010/main" val="1801276069"/>
+      </p:ext>
+    </p:extLst>
+  </p:cSld>
+  <p:clrMapOvr>
+    <a:masterClrMapping/>
+  </p:clrMapOvr>
+</p:sld>
+</file>
+
+<file path=ppt/slides/slide11.xml><?xml version="1.0" encoding="utf-8"?>
+<p:sld xmlns:a="http://schemas.openxmlformats.org/drawingml/2006/main" xmlns:r="http://schemas.openxmlformats.org/officeDocument/2006/relationships" xmlns:p="http://schemas.openxmlformats.org/presentationml/2006/main">
+  <p:cSld>
+    <p:spTree>
+      <p:nvGrpSpPr>
+        <p:cNvPr id="1" name=""/>
+        <p:cNvGrpSpPr/>
+        <p:nvPr/>
+      </p:nvGrpSpPr>
+      <p:grpSpPr>
+        <a:xfrm>
+          <a:off x="0" y="0"/>
+          <a:ext cx="0" cy="0"/>
+          <a:chOff x="0" y="0"/>
+          <a:chExt cx="0" cy="0"/>
+        </a:xfrm>
+      </p:grpSpPr>
+      <p:sp>
+        <p:nvSpPr>
+          <p:cNvPr id="2" name="Title 1">
+            <a:extLst>
+              <a:ext uri="{FF2B5EF4-FFF2-40B4-BE49-F238E27FC236}">
+                <a16:creationId xmlns:a16="http://schemas.microsoft.com/office/drawing/2014/main" id="{A95E2E6A-35EC-1B8E-0FD7-8C67870ACA64}"/>
+              </a:ext>
+            </a:extLst>
+          </p:cNvPr>
+          <p:cNvSpPr>
+            <a:spLocks noGrp="1"/>
+          </p:cNvSpPr>
+          <p:nvPr>
+            <p:ph type="ctrTitle"/>
+          </p:nvPr>
+        </p:nvSpPr>
+        <p:spPr/>
+        <p:txBody>
+          <a:bodyPr>
+            <a:normAutofit/>
+          </a:bodyPr>
+          <a:lstStyle/>
+          <a:p>
+            <a:r>
+              <a:rPr lang="en-US" sz="4800" dirty="0"/>
+              <a:t>Any question?</a:t>
+            </a:r>
+          </a:p>
+        </p:txBody>
+      </p:sp>
+      <p:sp>
+        <p:nvSpPr>
+          <p:cNvPr id="8" name="Slide Number Placeholder 7">
+            <a:extLst>
+              <a:ext uri="{FF2B5EF4-FFF2-40B4-BE49-F238E27FC236}">
+                <a16:creationId xmlns:a16="http://schemas.microsoft.com/office/drawing/2014/main" id="{8F44A959-C2BB-9170-C99C-1A2EDB71B994}"/>
+              </a:ext>
+            </a:extLst>
+          </p:cNvPr>
+          <p:cNvSpPr>
+            <a:spLocks noGrp="1"/>
+          </p:cNvSpPr>
+          <p:nvPr>
+            <p:ph type="sldNum" sz="quarter" idx="12"/>
+          </p:nvPr>
+        </p:nvSpPr>
+        <p:spPr/>
+        <p:txBody>
+          <a:bodyPr/>
+          <a:lstStyle/>
+          <a:p>
+            <a:fld id="{A49DFD55-3C28-40EF-9E31-A92D2E4017FF}" type="slidenum">
+              <a:rPr lang="en-US" smtClean="0"/>
+              <a:pPr/>
+              <a:t>11</a:t>
+            </a:fld>
+            <a:endParaRPr lang="en-US" dirty="0"/>
+          </a:p>
+        </p:txBody>
+      </p:sp>
+    </p:spTree>
+    <p:extLst>
+      <p:ext uri="{BB962C8B-B14F-4D97-AF65-F5344CB8AC3E}">
+        <p14:creationId xmlns:p14="http://schemas.microsoft.com/office/powerpoint/2010/main" val="103458723"/>
       </p:ext>
     </p:extLst>
   </p:cSld>
@@ -6854,8 +7172,8 @@
         </p:nvSpPr>
         <p:spPr>
           <a:xfrm>
-            <a:off x="7106115" y="2184969"/>
-            <a:ext cx="6094140" cy="1707455"/>
+            <a:off x="7099489" y="2184969"/>
+            <a:ext cx="4767833" cy="1707455"/>
           </a:xfrm>
           <a:prstGeom prst="rect">
             <a:avLst/>
@@ -6873,14 +7191,6 @@
                 <a:spcPct val="150000"/>
               </a:lnSpc>
             </a:pPr>
-            <a:r>
-              <a:rPr lang="en-US" dirty="0">
-                <a:solidFill>
-                  <a:schemeClr val="bg1"/>
-                </a:solidFill>
-              </a:rPr>
-              <a:t>Google Trends - </a:t>
-            </a:r>
             <a:r>
               <a:rPr lang="en-US" dirty="0">
                 <a:solidFill>
@@ -6888,7 +7198,7 @@
                 </a:solidFill>
                 <a:hlinkClick r:id="rId3"/>
               </a:rPr>
-              <a:t>https://trends.google.com/trends?geo=VI&amp;hl=en-US</a:t>
+              <a:t>Google Trends</a:t>
             </a:r>
             <a:endParaRPr lang="en-US" dirty="0">
               <a:solidFill>
@@ -6907,8 +7217,46 @@
                 <a:solidFill>
                   <a:schemeClr val="bg1"/>
                 </a:solidFill>
+                <a:hlinkClick r:id="rId4"/>
               </a:rPr>
-              <a:t>Python API – </a:t>
+              <a:t>Glimpse</a:t>
+            </a:r>
+            <a:endParaRPr lang="en-US" dirty="0">
+              <a:solidFill>
+                <a:schemeClr val="bg1"/>
+              </a:solidFill>
+            </a:endParaRPr>
+          </a:p>
+          <a:p>
+            <a:pPr>
+              <a:lnSpc>
+                <a:spcPct val="150000"/>
+              </a:lnSpc>
+            </a:pPr>
+            <a:r>
+              <a:rPr lang="en-US" dirty="0">
+                <a:solidFill>
+                  <a:schemeClr val="bg1"/>
+                </a:solidFill>
+              </a:rPr>
+              <a:t>Python APIs – </a:t>
+            </a:r>
+            <a:r>
+              <a:rPr lang="en-US" dirty="0" err="1">
+                <a:solidFill>
+                  <a:schemeClr val="bg1"/>
+                </a:solidFill>
+                <a:hlinkClick r:id="rId5"/>
+              </a:rPr>
+              <a:t>Pytrends</a:t>
+            </a:r>
+            <a:r>
+              <a:rPr lang="en-US" dirty="0">
+                <a:solidFill>
+                  <a:schemeClr val="bg1"/>
+                </a:solidFill>
+              </a:rPr>
+              <a:t>, </a:t>
             </a:r>
             <a:r>
               <a:rPr lang="en-US" dirty="0" err="1">
@@ -6916,7 +7264,7 @@
                   <a:schemeClr val="bg1"/>
                 </a:solidFill>
               </a:rPr>
-              <a:t>Pytrends</a:t>
+              <a:t>Binance</a:t>
             </a:r>
             <a:endParaRPr lang="en-US" dirty="0">
               <a:solidFill>
@@ -6952,7 +7300,7 @@
 </file>
 
 <file path=ppt/slides/slide4.xml><?xml version="1.0" encoding="utf-8"?>
-<p:sld xmlns:a="http://schemas.openxmlformats.org/drawingml/2006/main" xmlns:r="http://schemas.openxmlformats.org/officeDocument/2006/relationships" xmlns:p="http://schemas.openxmlformats.org/presentationml/2006/main">
+<p:sld xmlns:a="http://schemas.openxmlformats.org/drawingml/2006/main" xmlns:r="http://schemas.openxmlformats.org/officeDocument/2006/relationships" xmlns:p="http://schemas.openxmlformats.org/presentationml/2006/main" show="0">
   <p:cSld>
     <p:spTree>
       <p:nvGrpSpPr>
@@ -7066,7 +7414,7 @@
             <p:nvPr/>
           </p:nvPicPr>
           <p:blipFill>
-            <a:blip r:embed="rId2"/>
+            <a:blip r:embed="rId3"/>
             <a:stretch>
               <a:fillRect/>
             </a:stretch>
@@ -7096,7 +7444,7 @@
             <p:nvPr/>
           </p:nvPicPr>
           <p:blipFill>
-            <a:blip r:embed="rId3"/>
+            <a:blip r:embed="rId4"/>
             <a:stretch>
               <a:fillRect/>
             </a:stretch>
@@ -7126,7 +7474,7 @@
             <p:nvPr/>
           </p:nvPicPr>
           <p:blipFill>
-            <a:blip r:embed="rId4"/>
+            <a:blip r:embed="rId5"/>
             <a:stretch>
               <a:fillRect/>
             </a:stretch>
@@ -7156,7 +7504,7 @@
             <p:nvPr/>
           </p:nvPicPr>
           <p:blipFill>
-            <a:blip r:embed="rId5"/>
+            <a:blip r:embed="rId6"/>
             <a:stretch>
               <a:fillRect/>
             </a:stretch>
@@ -7186,7 +7534,7 @@
 </file>
 
 <file path=ppt/slides/slide5.xml><?xml version="1.0" encoding="utf-8"?>
-<p:sld xmlns:a="http://schemas.openxmlformats.org/drawingml/2006/main" xmlns:r="http://schemas.openxmlformats.org/officeDocument/2006/relationships" xmlns:p="http://schemas.openxmlformats.org/presentationml/2006/main">
+<p:sld xmlns:a="http://schemas.openxmlformats.org/drawingml/2006/main" xmlns:r="http://schemas.openxmlformats.org/officeDocument/2006/relationships" xmlns:p="http://schemas.openxmlformats.org/presentationml/2006/main" show="0">
   <p:cSld>
     <p:spTree>
       <p:nvGrpSpPr>
@@ -7555,10 +7903,10 @@
       </p:grpSpPr>
       <p:sp>
         <p:nvSpPr>
-          <p:cNvPr id="2" name="Title 1">
-            <a:extLst>
-              <a:ext uri="{FF2B5EF4-FFF2-40B4-BE49-F238E27FC236}">
-                <a16:creationId xmlns:a16="http://schemas.microsoft.com/office/drawing/2014/main" id="{A95E2E6A-35EC-1B8E-0FD7-8C67870ACA64}"/>
+          <p:cNvPr id="9" name="Title 1">
+            <a:extLst>
+              <a:ext uri="{FF2B5EF4-FFF2-40B4-BE49-F238E27FC236}">
+                <a16:creationId xmlns:a16="http://schemas.microsoft.com/office/drawing/2014/main" id="{1B71EDE3-8A5F-2990-1149-8272244EF52D}"/>
               </a:ext>
             </a:extLst>
           </p:cNvPr>
@@ -7569,26 +7917,84 @@
             <p:ph type="ctrTitle"/>
           </p:nvPr>
         </p:nvSpPr>
-        <p:spPr/>
-        <p:txBody>
-          <a:bodyPr>
+        <p:spPr>
+          <a:xfrm>
+            <a:off x="3597529" y="1221425"/>
+            <a:ext cx="6961454" cy="687469"/>
+          </a:xfrm>
+        </p:spPr>
+        <p:txBody>
+          <a:bodyPr anchor="b">
             <a:normAutofit/>
           </a:bodyPr>
           <a:lstStyle/>
           <a:p>
             <a:r>
-              <a:rPr lang="en-US" sz="4800" dirty="0"/>
-              <a:t>Any question?</a:t>
-            </a:r>
-          </a:p>
-        </p:txBody>
-      </p:sp>
-      <p:sp>
-        <p:nvSpPr>
-          <p:cNvPr id="8" name="Slide Number Placeholder 7">
-            <a:extLst>
-              <a:ext uri="{FF2B5EF4-FFF2-40B4-BE49-F238E27FC236}">
-                <a16:creationId xmlns:a16="http://schemas.microsoft.com/office/drawing/2014/main" id="{8F44A959-C2BB-9170-C99C-1A2EDB71B994}"/>
+              <a:rPr lang="en-US" dirty="0"/>
+              <a:t>Data normalization</a:t>
+            </a:r>
+          </a:p>
+        </p:txBody>
+      </p:sp>
+      <p:sp>
+        <p:nvSpPr>
+          <p:cNvPr id="23" name="Subtitle 2">
+            <a:extLst>
+              <a:ext uri="{FF2B5EF4-FFF2-40B4-BE49-F238E27FC236}">
+                <a16:creationId xmlns:a16="http://schemas.microsoft.com/office/drawing/2014/main" id="{F0464092-F755-2947-E366-479F2ED7B02C}"/>
+              </a:ext>
+            </a:extLst>
+          </p:cNvPr>
+          <p:cNvSpPr>
+            <a:spLocks noGrp="1"/>
+          </p:cNvSpPr>
+          <p:nvPr>
+            <p:ph type="subTitle" idx="1"/>
+          </p:nvPr>
+        </p:nvSpPr>
+        <p:spPr>
+          <a:xfrm>
+            <a:off x="3597529" y="2829969"/>
+            <a:ext cx="7648923" cy="3526382"/>
+          </a:xfrm>
+        </p:spPr>
+        <p:txBody>
+          <a:bodyPr>
+            <a:normAutofit fontScale="92500" lnSpcReduction="20000"/>
+          </a:bodyPr>
+          <a:lstStyle/>
+          <a:p>
+            <a:pPr marL="285750" indent="-285750">
+              <a:buFont typeface="Arial" panose="020B0604020202020204" pitchFamily="34" charset="0"/>
+              <a:buChar char="•"/>
+            </a:pPr>
+            <a:r>
+              <a:rPr lang="en-US" dirty="0"/>
+              <a:t>Data acquisition: </a:t>
+            </a:r>
+            <a:br>
+              <a:rPr lang="en-US" dirty="0"/>
+            </a:br>
+            <a:r>
+              <a:rPr lang="en-US" dirty="0"/>
+              <a:t>First issue we encountered was getting the data consistently, at the start we found that google trends had some issues to generally produce data on search frequency, additionally, when temporarily google trends did produce the data it would not always succeed in returning requested data on every device due to internet network issues.</a:t>
+            </a:r>
+            <a:br>
+              <a:rPr lang="en-US" dirty="0"/>
+            </a:br>
+            <a:r>
+              <a:rPr lang="en-US" dirty="0"/>
+              <a:t>To overcome that we saved relevant data locally on one of our computers and requested the data from a LAN connected device so connection to internet would get in the way of getting the data for the first time.</a:t>
+            </a:r>
+          </a:p>
+        </p:txBody>
+      </p:sp>
+      <p:sp>
+        <p:nvSpPr>
+          <p:cNvPr id="4" name="Slide Number Placeholder 3">
+            <a:extLst>
+              <a:ext uri="{FF2B5EF4-FFF2-40B4-BE49-F238E27FC236}">
+                <a16:creationId xmlns:a16="http://schemas.microsoft.com/office/drawing/2014/main" id="{739BF516-293D-150C-2CFC-D8F53F5A4394}"/>
               </a:ext>
             </a:extLst>
           </p:cNvPr>
@@ -7599,24 +8005,755 @@
             <p:ph type="sldNum" sz="quarter" idx="12"/>
           </p:nvPr>
         </p:nvSpPr>
-        <p:spPr/>
-        <p:txBody>
-          <a:bodyPr/>
+        <p:spPr>
+          <a:xfrm>
+            <a:off x="9579428" y="6356350"/>
+            <a:ext cx="1774371" cy="365125"/>
+          </a:xfrm>
+        </p:spPr>
+        <p:txBody>
+          <a:bodyPr anchor="ctr">
+            <a:normAutofit/>
+          </a:bodyPr>
           <a:lstStyle/>
           <a:p>
+            <a:pPr>
+              <a:spcAft>
+                <a:spcPts val="600"/>
+              </a:spcAft>
+            </a:pPr>
             <a:fld id="{A49DFD55-3C28-40EF-9E31-A92D2E4017FF}" type="slidenum">
               <a:rPr lang="en-US" smtClean="0"/>
-              <a:pPr/>
+              <a:pPr>
+                <a:spcAft>
+                  <a:spcPts val="600"/>
+                </a:spcAft>
+              </a:pPr>
               <a:t>7</a:t>
             </a:fld>
-            <a:endParaRPr lang="en-US" dirty="0"/>
+            <a:endParaRPr lang="en-US"/>
           </a:p>
         </p:txBody>
       </p:sp>
     </p:spTree>
     <p:extLst>
       <p:ext uri="{BB962C8B-B14F-4D97-AF65-F5344CB8AC3E}">
-        <p14:creationId xmlns:p14="http://schemas.microsoft.com/office/powerpoint/2010/main" val="103458723"/>
+        <p14:creationId xmlns:p14="http://schemas.microsoft.com/office/powerpoint/2010/main" val="1525213900"/>
+      </p:ext>
+    </p:extLst>
+  </p:cSld>
+  <p:clrMapOvr>
+    <a:masterClrMapping/>
+  </p:clrMapOvr>
+</p:sld>
+</file>
+
+<file path=ppt/slides/slide8.xml><?xml version="1.0" encoding="utf-8"?>
+<p:sld xmlns:a="http://schemas.openxmlformats.org/drawingml/2006/main" xmlns:r="http://schemas.openxmlformats.org/officeDocument/2006/relationships" xmlns:p="http://schemas.openxmlformats.org/presentationml/2006/main">
+  <p:cSld>
+    <p:spTree>
+      <p:nvGrpSpPr>
+        <p:cNvPr id="1" name=""/>
+        <p:cNvGrpSpPr/>
+        <p:nvPr/>
+      </p:nvGrpSpPr>
+      <p:grpSpPr>
+        <a:xfrm>
+          <a:off x="0" y="0"/>
+          <a:ext cx="0" cy="0"/>
+          <a:chOff x="0" y="0"/>
+          <a:chExt cx="0" cy="0"/>
+        </a:xfrm>
+      </p:grpSpPr>
+      <p:sp>
+        <p:nvSpPr>
+          <p:cNvPr id="9" name="Title 1">
+            <a:extLst>
+              <a:ext uri="{FF2B5EF4-FFF2-40B4-BE49-F238E27FC236}">
+                <a16:creationId xmlns:a16="http://schemas.microsoft.com/office/drawing/2014/main" id="{E512DE17-6D27-A192-2D4F-70EDE0AF52CA}"/>
+              </a:ext>
+            </a:extLst>
+          </p:cNvPr>
+          <p:cNvSpPr>
+            <a:spLocks noGrp="1"/>
+          </p:cNvSpPr>
+          <p:nvPr>
+            <p:ph type="title"/>
+          </p:nvPr>
+        </p:nvSpPr>
+        <p:spPr>
+          <a:xfrm>
+            <a:off x="1322318" y="268361"/>
+            <a:ext cx="7288282" cy="1700604"/>
+          </a:xfrm>
+        </p:spPr>
+        <p:txBody>
+          <a:bodyPr anchor="b">
+            <a:normAutofit/>
+          </a:bodyPr>
+          <a:lstStyle/>
+          <a:p>
+            <a:r>
+              <a:rPr lang="en-US" dirty="0"/>
+              <a:t>Data normalization (continuation)</a:t>
+            </a:r>
+          </a:p>
+        </p:txBody>
+      </p:sp>
+      <p:sp>
+        <p:nvSpPr>
+          <p:cNvPr id="13" name="Content Placeholder 4">
+            <a:extLst>
+              <a:ext uri="{FF2B5EF4-FFF2-40B4-BE49-F238E27FC236}">
+                <a16:creationId xmlns:a16="http://schemas.microsoft.com/office/drawing/2014/main" id="{9ACFE1C8-FCB0-A9EA-4356-19B9AE73DE02}"/>
+              </a:ext>
+            </a:extLst>
+          </p:cNvPr>
+          <p:cNvSpPr>
+            <a:spLocks noGrp="1"/>
+          </p:cNvSpPr>
+          <p:nvPr>
+            <p:ph sz="half" idx="2"/>
+          </p:nvPr>
+        </p:nvSpPr>
+        <p:spPr>
+          <a:xfrm>
+            <a:off x="1322388" y="2763078"/>
+            <a:ext cx="7288212" cy="3407051"/>
+          </a:xfrm>
+        </p:spPr>
+        <p:txBody>
+          <a:bodyPr>
+            <a:normAutofit lnSpcReduction="10000"/>
+          </a:bodyPr>
+          <a:lstStyle/>
+          <a:p>
+            <a:pPr marL="285750" indent="-285750">
+              <a:lnSpc>
+                <a:spcPct val="90000"/>
+              </a:lnSpc>
+              <a:buFont typeface="Arial" panose="020B0604020202020204" pitchFamily="34" charset="0"/>
+              <a:buChar char="•"/>
+            </a:pPr>
+            <a:r>
+              <a:rPr lang="en-US" sz="1500" dirty="0"/>
+              <a:t>Data Cleaning &amp; Organizing: </a:t>
+            </a:r>
+            <a:br>
+              <a:rPr lang="en-US" sz="1500" dirty="0"/>
+            </a:br>
+            <a:r>
+              <a:rPr lang="en-US" sz="1500" dirty="0"/>
+              <a:t>When we request the data from google trends through the website manually or through the python </a:t>
+            </a:r>
+            <a:r>
+              <a:rPr lang="en-US" sz="1500" dirty="0" err="1"/>
+              <a:t>api</a:t>
+            </a:r>
+            <a:r>
+              <a:rPr lang="en-US" sz="1500" dirty="0"/>
+              <a:t> the data we get in return is limited to be up to 270 samples each time, and each data set of 270 is normalized on itself using an internal method of google trends, in other words, we couldn’t get the real absolute quantity of searches and couldn’t calculate it by any reliable means.</a:t>
+            </a:r>
+            <a:br>
+              <a:rPr lang="en-US" sz="1500" dirty="0"/>
+            </a:br>
+            <a:r>
+              <a:rPr lang="en-US" sz="1500" dirty="0"/>
+              <a:t>This poses an even greater issue since we couldn’t connect the datasets we could have got from google trends because the scale the samples are normalized to is different almost every time (rarely it could be of the same scale reliably).</a:t>
+            </a:r>
+            <a:br>
+              <a:rPr lang="en-US" sz="1500" dirty="0"/>
+            </a:br>
+            <a:r>
+              <a:rPr lang="en-US" sz="1500" dirty="0"/>
+              <a:t>To solve that we used an additional tool, Glimpse, an addon for google trends that returns an approximated quantity of searches, since we used a total of 5 year timeframe, glimpse gave us weekly samples.</a:t>
+            </a:r>
+            <a:br>
+              <a:rPr lang="en-US" sz="1500" dirty="0"/>
+            </a:br>
+            <a:r>
+              <a:rPr lang="en-US" sz="1500" dirty="0"/>
+              <a:t>Using the approximated quantity and the distribution of each data set from google trends we were able to approximate a reliable enough data set containing daily samples of continuous nature.</a:t>
+            </a:r>
+            <a:br>
+              <a:rPr lang="en-US" sz="1500" dirty="0"/>
+            </a:br>
+            <a:r>
+              <a:rPr lang="en-US" sz="1500" dirty="0"/>
+              <a:t>After doing so we normalized all the data to be from 0 to 100</a:t>
+            </a:r>
+          </a:p>
+        </p:txBody>
+      </p:sp>
+      <p:sp>
+        <p:nvSpPr>
+          <p:cNvPr id="4" name="Slide Number Placeholder 3">
+            <a:extLst>
+              <a:ext uri="{FF2B5EF4-FFF2-40B4-BE49-F238E27FC236}">
+                <a16:creationId xmlns:a16="http://schemas.microsoft.com/office/drawing/2014/main" id="{B4801588-62AB-3DEE-6DA8-C2478CCC79DB}"/>
+              </a:ext>
+            </a:extLst>
+          </p:cNvPr>
+          <p:cNvSpPr>
+            <a:spLocks noGrp="1"/>
+          </p:cNvSpPr>
+          <p:nvPr>
+            <p:ph type="sldNum" sz="quarter" idx="12"/>
+          </p:nvPr>
+        </p:nvSpPr>
+        <p:spPr>
+          <a:xfrm>
+            <a:off x="10373350" y="6356349"/>
+            <a:ext cx="987552" cy="365125"/>
+          </a:xfrm>
+        </p:spPr>
+        <p:txBody>
+          <a:bodyPr anchor="ctr">
+            <a:normAutofit/>
+          </a:bodyPr>
+          <a:lstStyle/>
+          <a:p>
+            <a:pPr>
+              <a:spcAft>
+                <a:spcPts val="600"/>
+              </a:spcAft>
+            </a:pPr>
+            <a:fld id="{A49DFD55-3C28-40EF-9E31-A92D2E4017FF}" type="slidenum">
+              <a:rPr lang="en-US" smtClean="0"/>
+              <a:pPr>
+                <a:spcAft>
+                  <a:spcPts val="600"/>
+                </a:spcAft>
+              </a:pPr>
+              <a:t>8</a:t>
+            </a:fld>
+            <a:endParaRPr lang="en-US"/>
+          </a:p>
+        </p:txBody>
+      </p:sp>
+    </p:spTree>
+    <p:extLst>
+      <p:ext uri="{BB962C8B-B14F-4D97-AF65-F5344CB8AC3E}">
+        <p14:creationId xmlns:p14="http://schemas.microsoft.com/office/powerpoint/2010/main" val="2400125619"/>
+      </p:ext>
+    </p:extLst>
+  </p:cSld>
+  <p:clrMapOvr>
+    <a:masterClrMapping/>
+  </p:clrMapOvr>
+</p:sld>
+</file>
+
+<file path=ppt/slides/slide9.xml><?xml version="1.0" encoding="utf-8"?>
+<p:sld xmlns:a="http://schemas.openxmlformats.org/drawingml/2006/main" xmlns:r="http://schemas.openxmlformats.org/officeDocument/2006/relationships" xmlns:p="http://schemas.openxmlformats.org/presentationml/2006/main">
+  <p:cSld>
+    <p:spTree>
+      <p:nvGrpSpPr>
+        <p:cNvPr id="1" name=""/>
+        <p:cNvGrpSpPr/>
+        <p:nvPr/>
+      </p:nvGrpSpPr>
+      <p:grpSpPr>
+        <a:xfrm>
+          <a:off x="0" y="0"/>
+          <a:ext cx="0" cy="0"/>
+          <a:chOff x="0" y="0"/>
+          <a:chExt cx="0" cy="0"/>
+        </a:xfrm>
+      </p:grpSpPr>
+      <p:sp>
+        <p:nvSpPr>
+          <p:cNvPr id="2" name="Title 1">
+            <a:extLst>
+              <a:ext uri="{FF2B5EF4-FFF2-40B4-BE49-F238E27FC236}">
+                <a16:creationId xmlns:a16="http://schemas.microsoft.com/office/drawing/2014/main" id="{9B3FB6E1-E8C7-A4E6-59B3-DB0B99BA2838}"/>
+              </a:ext>
+            </a:extLst>
+          </p:cNvPr>
+          <p:cNvSpPr>
+            <a:spLocks noGrp="1"/>
+          </p:cNvSpPr>
+          <p:nvPr>
+            <p:ph type="ctrTitle"/>
+          </p:nvPr>
+        </p:nvSpPr>
+        <p:spPr>
+          <a:xfrm>
+            <a:off x="797458" y="674121"/>
+            <a:ext cx="4006455" cy="1307079"/>
+          </a:xfrm>
+        </p:spPr>
+        <p:txBody>
+          <a:bodyPr anchor="b">
+            <a:normAutofit/>
+          </a:bodyPr>
+          <a:lstStyle/>
+          <a:p>
+            <a:r>
+              <a:rPr lang="en-US" dirty="0"/>
+              <a:t>Strategy &amp; </a:t>
+            </a:r>
+            <a:r>
+              <a:rPr lang="en-US" dirty="0" err="1"/>
+              <a:t>backtesting</a:t>
+            </a:r>
+            <a:endParaRPr lang="en-IL" dirty="0"/>
+          </a:p>
+        </p:txBody>
+      </p:sp>
+      <p:sp>
+        <p:nvSpPr>
+          <p:cNvPr id="4" name="Slide Number Placeholder 3">
+            <a:extLst>
+              <a:ext uri="{FF2B5EF4-FFF2-40B4-BE49-F238E27FC236}">
+                <a16:creationId xmlns:a16="http://schemas.microsoft.com/office/drawing/2014/main" id="{2DAA54C8-44C4-7040-B3BB-747643B3D86C}"/>
+              </a:ext>
+            </a:extLst>
+          </p:cNvPr>
+          <p:cNvSpPr>
+            <a:spLocks noGrp="1"/>
+          </p:cNvSpPr>
+          <p:nvPr>
+            <p:ph type="sldNum" sz="quarter" idx="4294967295"/>
+          </p:nvPr>
+        </p:nvSpPr>
+        <p:spPr>
+          <a:xfrm>
+            <a:off x="11204575" y="6356350"/>
+            <a:ext cx="987425" cy="365125"/>
+          </a:xfrm>
+        </p:spPr>
+        <p:txBody>
+          <a:bodyPr anchor="ctr">
+            <a:normAutofit/>
+          </a:bodyPr>
+          <a:lstStyle/>
+          <a:p>
+            <a:pPr>
+              <a:spcAft>
+                <a:spcPts val="600"/>
+              </a:spcAft>
+            </a:pPr>
+            <a:fld id="{A49DFD55-3C28-40EF-9E31-A92D2E4017FF}" type="slidenum">
+              <a:rPr lang="en-US" smtClean="0"/>
+              <a:pPr>
+                <a:spcAft>
+                  <a:spcPts val="600"/>
+                </a:spcAft>
+              </a:pPr>
+              <a:t>9</a:t>
+            </a:fld>
+            <a:endParaRPr lang="en-US"/>
+          </a:p>
+        </p:txBody>
+      </p:sp>
+      <p:sp>
+        <p:nvSpPr>
+          <p:cNvPr id="9" name="Content Placeholder 2">
+            <a:extLst>
+              <a:ext uri="{FF2B5EF4-FFF2-40B4-BE49-F238E27FC236}">
+                <a16:creationId xmlns:a16="http://schemas.microsoft.com/office/drawing/2014/main" id="{E52056BD-A87B-DE96-99F0-C9F084A2D799}"/>
+              </a:ext>
+            </a:extLst>
+          </p:cNvPr>
+          <p:cNvSpPr txBox="1">
+            <a:spLocks/>
+          </p:cNvSpPr>
+          <p:nvPr/>
+        </p:nvSpPr>
+        <p:spPr>
+          <a:xfrm>
+            <a:off x="797459" y="2577547"/>
+            <a:ext cx="10407116" cy="3929270"/>
+          </a:xfrm>
+          <a:prstGeom prst="rect">
+            <a:avLst/>
+          </a:prstGeom>
+        </p:spPr>
+        <p:txBody>
+          <a:bodyPr>
+            <a:normAutofit fontScale="40000" lnSpcReduction="20000"/>
+          </a:bodyPr>
+          <a:lstStyle>
+            <a:lvl1pPr marL="228600" indent="-228600" algn="l" defTabSz="914400" rtl="0" eaLnBrk="1" latinLnBrk="0" hangingPunct="1">
+              <a:lnSpc>
+                <a:spcPct val="90000"/>
+              </a:lnSpc>
+              <a:spcBef>
+                <a:spcPts val="1000"/>
+              </a:spcBef>
+              <a:buFont typeface="Arial" panose="020B0604020202020204" pitchFamily="34" charset="0"/>
+              <a:buChar char="•"/>
+              <a:defRPr sz="2800" kern="1200">
+                <a:solidFill>
+                  <a:schemeClr val="tx1"/>
+                </a:solidFill>
+                <a:latin typeface="+mn-lt"/>
+                <a:ea typeface="+mn-ea"/>
+                <a:cs typeface="+mn-cs"/>
+              </a:defRPr>
+            </a:lvl1pPr>
+            <a:lvl2pPr marL="685800" indent="-228600" algn="l" defTabSz="914400" rtl="0" eaLnBrk="1" latinLnBrk="0" hangingPunct="1">
+              <a:lnSpc>
+                <a:spcPct val="90000"/>
+              </a:lnSpc>
+              <a:spcBef>
+                <a:spcPts val="500"/>
+              </a:spcBef>
+              <a:buFont typeface="Arial" panose="020B0604020202020204" pitchFamily="34" charset="0"/>
+              <a:buChar char="•"/>
+              <a:defRPr sz="2400" kern="1200">
+                <a:solidFill>
+                  <a:schemeClr val="tx1"/>
+                </a:solidFill>
+                <a:latin typeface="+mn-lt"/>
+                <a:ea typeface="+mn-ea"/>
+                <a:cs typeface="+mn-cs"/>
+              </a:defRPr>
+            </a:lvl2pPr>
+            <a:lvl3pPr marL="1143000" indent="-228600" algn="l" defTabSz="914400" rtl="0" eaLnBrk="1" latinLnBrk="0" hangingPunct="1">
+              <a:lnSpc>
+                <a:spcPct val="90000"/>
+              </a:lnSpc>
+              <a:spcBef>
+                <a:spcPts val="500"/>
+              </a:spcBef>
+              <a:buFont typeface="Arial" panose="020B0604020202020204" pitchFamily="34" charset="0"/>
+              <a:buChar char="•"/>
+              <a:defRPr sz="2000" kern="1200">
+                <a:solidFill>
+                  <a:schemeClr val="tx1"/>
+                </a:solidFill>
+                <a:latin typeface="+mn-lt"/>
+                <a:ea typeface="+mn-ea"/>
+                <a:cs typeface="+mn-cs"/>
+              </a:defRPr>
+            </a:lvl3pPr>
+            <a:lvl4pPr marL="1600200" indent="-228600" algn="l" defTabSz="914400" rtl="0" eaLnBrk="1" latinLnBrk="0" hangingPunct="1">
+              <a:lnSpc>
+                <a:spcPct val="90000"/>
+              </a:lnSpc>
+              <a:spcBef>
+                <a:spcPts val="500"/>
+              </a:spcBef>
+              <a:buFont typeface="Arial" panose="020B0604020202020204" pitchFamily="34" charset="0"/>
+              <a:buChar char="•"/>
+              <a:defRPr sz="1800" kern="1200">
+                <a:solidFill>
+                  <a:schemeClr val="tx1"/>
+                </a:solidFill>
+                <a:latin typeface="+mn-lt"/>
+                <a:ea typeface="+mn-ea"/>
+                <a:cs typeface="+mn-cs"/>
+              </a:defRPr>
+            </a:lvl4pPr>
+            <a:lvl5pPr marL="2057400" indent="-228600" algn="l" defTabSz="914400" rtl="0" eaLnBrk="1" latinLnBrk="0" hangingPunct="1">
+              <a:lnSpc>
+                <a:spcPct val="90000"/>
+              </a:lnSpc>
+              <a:spcBef>
+                <a:spcPts val="500"/>
+              </a:spcBef>
+              <a:buFont typeface="Arial" panose="020B0604020202020204" pitchFamily="34" charset="0"/>
+              <a:buChar char="•"/>
+              <a:defRPr sz="1800" kern="1200">
+                <a:solidFill>
+                  <a:schemeClr val="tx1"/>
+                </a:solidFill>
+                <a:latin typeface="+mn-lt"/>
+                <a:ea typeface="+mn-ea"/>
+                <a:cs typeface="+mn-cs"/>
+              </a:defRPr>
+            </a:lvl5pPr>
+            <a:lvl6pPr marL="2514600" indent="-228600" algn="l" defTabSz="914400" rtl="0" eaLnBrk="1" latinLnBrk="0" hangingPunct="1">
+              <a:lnSpc>
+                <a:spcPct val="90000"/>
+              </a:lnSpc>
+              <a:spcBef>
+                <a:spcPts val="500"/>
+              </a:spcBef>
+              <a:buFont typeface="Arial" panose="020B0604020202020204" pitchFamily="34" charset="0"/>
+              <a:buChar char="•"/>
+              <a:defRPr sz="1800" kern="1200">
+                <a:solidFill>
+                  <a:schemeClr val="tx1"/>
+                </a:solidFill>
+                <a:latin typeface="+mn-lt"/>
+                <a:ea typeface="+mn-ea"/>
+                <a:cs typeface="+mn-cs"/>
+              </a:defRPr>
+            </a:lvl6pPr>
+            <a:lvl7pPr marL="2971800" indent="-228600" algn="l" defTabSz="914400" rtl="0" eaLnBrk="1" latinLnBrk="0" hangingPunct="1">
+              <a:lnSpc>
+                <a:spcPct val="90000"/>
+              </a:lnSpc>
+              <a:spcBef>
+                <a:spcPts val="500"/>
+              </a:spcBef>
+              <a:buFont typeface="Arial" panose="020B0604020202020204" pitchFamily="34" charset="0"/>
+              <a:buChar char="•"/>
+              <a:defRPr sz="1800" kern="1200">
+                <a:solidFill>
+                  <a:schemeClr val="tx1"/>
+                </a:solidFill>
+                <a:latin typeface="+mn-lt"/>
+                <a:ea typeface="+mn-ea"/>
+                <a:cs typeface="+mn-cs"/>
+              </a:defRPr>
+            </a:lvl7pPr>
+            <a:lvl8pPr marL="3429000" indent="-228600" algn="l" defTabSz="914400" rtl="0" eaLnBrk="1" latinLnBrk="0" hangingPunct="1">
+              <a:lnSpc>
+                <a:spcPct val="90000"/>
+              </a:lnSpc>
+              <a:spcBef>
+                <a:spcPts val="500"/>
+              </a:spcBef>
+              <a:buFont typeface="Arial" panose="020B0604020202020204" pitchFamily="34" charset="0"/>
+              <a:buChar char="•"/>
+              <a:defRPr sz="1800" kern="1200">
+                <a:solidFill>
+                  <a:schemeClr val="tx1"/>
+                </a:solidFill>
+                <a:latin typeface="+mn-lt"/>
+                <a:ea typeface="+mn-ea"/>
+                <a:cs typeface="+mn-cs"/>
+              </a:defRPr>
+            </a:lvl8pPr>
+            <a:lvl9pPr marL="3886200" indent="-228600" algn="l" defTabSz="914400" rtl="0" eaLnBrk="1" latinLnBrk="0" hangingPunct="1">
+              <a:lnSpc>
+                <a:spcPct val="90000"/>
+              </a:lnSpc>
+              <a:spcBef>
+                <a:spcPts val="500"/>
+              </a:spcBef>
+              <a:buFont typeface="Arial" panose="020B0604020202020204" pitchFamily="34" charset="0"/>
+              <a:buChar char="•"/>
+              <a:defRPr sz="1800" kern="1200">
+                <a:solidFill>
+                  <a:schemeClr val="tx1"/>
+                </a:solidFill>
+                <a:latin typeface="+mn-lt"/>
+                <a:ea typeface="+mn-ea"/>
+                <a:cs typeface="+mn-cs"/>
+              </a:defRPr>
+            </a:lvl9pPr>
+          </a:lstStyle>
+          <a:p>
+            <a:pPr marL="0" indent="0">
+              <a:buNone/>
+            </a:pPr>
+            <a:r>
+              <a:rPr lang="en-US" dirty="0">
+                <a:solidFill>
+                  <a:schemeClr val="bg1"/>
+                </a:solidFill>
+              </a:rPr>
+              <a:t>The strategy is based on a granger causality test for each coin to determine how much delay should be set for the normalized trends data to gain the maximum plausible causality of the trends data on the price data.</a:t>
+            </a:r>
+          </a:p>
+          <a:p>
+            <a:pPr marL="0" indent="0">
+              <a:buNone/>
+            </a:pPr>
+            <a:r>
+              <a:rPr lang="en-US" dirty="0">
+                <a:solidFill>
+                  <a:schemeClr val="bg1"/>
+                </a:solidFill>
+              </a:rPr>
+              <a:t>Additionally, we filtered out coins that the granger causality said that their maximum plausible causality delay isn’t plausible enough (Hyper Parameter: maximum       P-value allowed from the granger causality test).</a:t>
+            </a:r>
+          </a:p>
+          <a:p>
+            <a:pPr marL="0" indent="0">
+              <a:buNone/>
+            </a:pPr>
+            <a:r>
+              <a:rPr lang="en-US" dirty="0">
+                <a:solidFill>
+                  <a:schemeClr val="bg1"/>
+                </a:solidFill>
+              </a:rPr>
+              <a:t>Than for each coin separately we calculated the signals to buy and sell, where the buy and sell signal are determined through the use of Bollinger bands on the normalized trends data (Hyper Parameters: MA window, amount of </a:t>
+            </a:r>
+            <a:r>
+              <a:rPr lang="en-US" dirty="0" err="1">
+                <a:solidFill>
+                  <a:schemeClr val="bg1"/>
+                </a:solidFill>
+              </a:rPr>
+              <a:t>sd</a:t>
+            </a:r>
+            <a:r>
+              <a:rPr lang="en-US" dirty="0">
+                <a:solidFill>
+                  <a:schemeClr val="bg1"/>
+                </a:solidFill>
+              </a:rPr>
+              <a:t> added to upper band and amount of </a:t>
+            </a:r>
+            <a:r>
+              <a:rPr lang="en-US" dirty="0" err="1">
+                <a:solidFill>
+                  <a:schemeClr val="bg1"/>
+                </a:solidFill>
+              </a:rPr>
+              <a:t>sd</a:t>
+            </a:r>
+            <a:r>
+              <a:rPr lang="en-US" dirty="0">
+                <a:solidFill>
+                  <a:schemeClr val="bg1"/>
+                </a:solidFill>
+              </a:rPr>
+              <a:t> subtracted from lower band) and through the use of RSI on the Close price of the coin (Hyper Parameters: RSI window and RSI limits) as a limiting force for the Bollinger bands when the prices of the coins become too noisy and therefor too risky to trade.</a:t>
+            </a:r>
+          </a:p>
+          <a:p>
+            <a:pPr marL="0" indent="0">
+              <a:buNone/>
+            </a:pPr>
+            <a:r>
+              <a:rPr lang="en-US" dirty="0">
+                <a:solidFill>
+                  <a:schemeClr val="bg1"/>
+                </a:solidFill>
+              </a:rPr>
+              <a:t>After that we connect the data of all of the coins and order the samples by their dates and apply the signals.</a:t>
+            </a:r>
+          </a:p>
+          <a:p>
+            <a:pPr marL="0" indent="0">
+              <a:buNone/>
+            </a:pPr>
+            <a:r>
+              <a:rPr lang="en-US" dirty="0">
+                <a:solidFill>
+                  <a:schemeClr val="bg1"/>
+                </a:solidFill>
+              </a:rPr>
+              <a:t>When there is a Buy signal we compute using the balance, a scaling number (Hyper Parameter: quantity scale) and the ratio of the normalized trend with the upper band of the Bollinger bands how many of the current coin to buy, and using the Open and Close prices of the coin the price of that coin using slippage correction over the Open price.</a:t>
+            </a:r>
+            <a:br>
+              <a:rPr lang="en-US" dirty="0">
+                <a:solidFill>
+                  <a:schemeClr val="bg1"/>
+                </a:solidFill>
+              </a:rPr>
+            </a:br>
+            <a:r>
+              <a:rPr lang="en-US" dirty="0">
+                <a:solidFill>
+                  <a:schemeClr val="bg1"/>
+                </a:solidFill>
+              </a:rPr>
+              <a:t>It is important to mention that after the buying action using the quantity calculated the value of the portfolio is updated.</a:t>
+            </a:r>
+          </a:p>
+          <a:p>
+            <a:pPr marL="0" indent="0">
+              <a:buNone/>
+            </a:pPr>
+            <a:r>
+              <a:rPr lang="en-US" dirty="0">
+                <a:solidFill>
+                  <a:schemeClr val="bg1"/>
+                </a:solidFill>
+              </a:rPr>
+              <a:t>When there is a Sell signal we sell all of the held amount of that coin up until that date, that amount is sold as well with the price that was calculated using slippage correction over the Open price.</a:t>
+            </a:r>
+            <a:br>
+              <a:rPr lang="en-US" dirty="0">
+                <a:solidFill>
+                  <a:schemeClr val="bg1"/>
+                </a:solidFill>
+              </a:rPr>
+            </a:br>
+            <a:r>
+              <a:rPr lang="en-US" dirty="0">
+                <a:solidFill>
+                  <a:schemeClr val="bg1"/>
+                </a:solidFill>
+              </a:rPr>
+              <a:t>It is important to mention that after the selling action using the quantity calculated the value of the portfolio is updated.</a:t>
+            </a:r>
+            <a:br>
+              <a:rPr lang="en-US" dirty="0">
+                <a:solidFill>
+                  <a:schemeClr val="bg1"/>
+                </a:solidFill>
+              </a:rPr>
+            </a:br>
+            <a:r>
+              <a:rPr lang="en-US" dirty="0">
+                <a:solidFill>
+                  <a:schemeClr val="bg1"/>
+                </a:solidFill>
+              </a:rPr>
+              <a:t>Originally the Quantity sold of a particular coin was calculated in a similar way to how it is calculated for the Buy signal, but due to many results from the </a:t>
+            </a:r>
+            <a:r>
+              <a:rPr lang="en-US" dirty="0" err="1">
+                <a:solidFill>
+                  <a:schemeClr val="bg1"/>
+                </a:solidFill>
+              </a:rPr>
+              <a:t>backtesting</a:t>
+            </a:r>
+            <a:r>
+              <a:rPr lang="en-US" dirty="0">
+                <a:solidFill>
+                  <a:schemeClr val="bg1"/>
+                </a:solidFill>
+              </a:rPr>
+              <a:t> we determined that it is best and most efficient to always sell all when a sell signal is given.</a:t>
+            </a:r>
+          </a:p>
+          <a:p>
+            <a:pPr marL="0" indent="0">
+              <a:buNone/>
+            </a:pPr>
+            <a:r>
+              <a:rPr lang="en-US" dirty="0">
+                <a:solidFill>
+                  <a:schemeClr val="bg1"/>
+                </a:solidFill>
+              </a:rPr>
+              <a:t>When there is no Buy or Sell signal the value of the amount of the coin held, is updated in the value of the overall portfolio, again, using the price calculated using slippage correction over the Open price.</a:t>
+            </a:r>
+          </a:p>
+          <a:p>
+            <a:pPr marL="0" indent="0">
+              <a:buNone/>
+            </a:pPr>
+            <a:r>
+              <a:rPr lang="en-US" dirty="0">
+                <a:solidFill>
+                  <a:schemeClr val="bg1"/>
+                </a:solidFill>
+              </a:rPr>
+              <a:t>Finally, after all of that we calculated for each version of this strategy (a version is this strategy with a different set of Hyper-Parameters) performance metrics to evaluate and find which version performed the best.</a:t>
+            </a:r>
+          </a:p>
+          <a:p>
+            <a:pPr marL="0" indent="0">
+              <a:buNone/>
+            </a:pPr>
+            <a:r>
+              <a:rPr lang="en-US" dirty="0">
+                <a:solidFill>
+                  <a:schemeClr val="bg1"/>
+                </a:solidFill>
+              </a:rPr>
+              <a:t>Additionally, we made a comparison strategy with the simple methodology of Buy &amp; Hold (A.K.A. Hoddle) and calculated its performance metrics as well for comparison.</a:t>
+            </a:r>
+          </a:p>
+        </p:txBody>
+      </p:sp>
+    </p:spTree>
+    <p:extLst>
+      <p:ext uri="{BB962C8B-B14F-4D97-AF65-F5344CB8AC3E}">
+        <p14:creationId xmlns:p14="http://schemas.microsoft.com/office/powerpoint/2010/main" val="499812037"/>
       </p:ext>
     </p:extLst>
   </p:cSld>
@@ -8418,15 +9555,6 @@
 </file>
 
 <file path=customXml/item1.xml><?xml version="1.0" encoding="utf-8"?>
-<?mso-contentType ?>
-<FormTemplates xmlns="http://schemas.microsoft.com/sharepoint/v3/contenttype/forms">
-  <Display>DocumentLibraryForm</Display>
-  <Edit>DocumentLibraryForm</Edit>
-  <New>DocumentLibraryForm</New>
-</FormTemplates>
-</file>
-
-<file path=customXml/item2.xml><?xml version="1.0" encoding="utf-8"?>
 <p:properties xmlns:p="http://schemas.microsoft.com/office/2006/metadata/properties" xmlns:xsi="http://www.w3.org/2001/XMLSchema-instance" xmlns:pc="http://schemas.microsoft.com/office/infopath/2007/PartnerControls">
   <documentManagement>
     <_ip_UnifiedCompliancePolicyUIAction xmlns="http://schemas.microsoft.com/sharepoint/v3" xsi:nil="true"/>
@@ -8444,6 +9572,15 @@
     <MediaServiceKeyPoints xmlns="71af3243-3dd4-4a8d-8c0d-dd76da1f02a5" xsi:nil="true"/>
   </documentManagement>
 </p:properties>
+</file>
+
+<file path=customXml/item2.xml><?xml version="1.0" encoding="utf-8"?>
+<?mso-contentType ?>
+<FormTemplates xmlns="http://schemas.microsoft.com/sharepoint/v3/contenttype/forms">
+  <Display>DocumentLibraryForm</Display>
+  <Edit>DocumentLibraryForm</Edit>
+  <New>DocumentLibraryForm</New>
+</FormTemplates>
 </file>
 
 <file path=customXml/item3.xml><?xml version="1.0" encoding="utf-8"?>
@@ -8759,14 +9896,6 @@
 </file>
 
 <file path=customXml/itemProps1.xml><?xml version="1.0" encoding="utf-8"?>
-<ds:datastoreItem xmlns:ds="http://schemas.openxmlformats.org/officeDocument/2006/customXml" ds:itemID="{CABF691C-888B-4061-8A6F-D5CE84A0254B}">
-  <ds:schemaRefs>
-    <ds:schemaRef ds:uri="http://schemas.microsoft.com/sharepoint/v3/contenttype/forms"/>
-  </ds:schemaRefs>
-</ds:datastoreItem>
-</file>
-
-<file path=customXml/itemProps2.xml><?xml version="1.0" encoding="utf-8"?>
 <ds:datastoreItem xmlns:ds="http://schemas.openxmlformats.org/officeDocument/2006/customXml" ds:itemID="{49168DCE-134F-4610-A6AA-88CEBE8D71D2}">
   <ds:schemaRefs>
     <ds:schemaRef ds:uri="http://schemas.microsoft.com/office/2006/metadata/properties"/>
@@ -8774,6 +9903,14 @@
     <ds:schemaRef ds:uri="http://schemas.microsoft.com/sharepoint/v3"/>
     <ds:schemaRef ds:uri="71af3243-3dd4-4a8d-8c0d-dd76da1f02a5"/>
     <ds:schemaRef ds:uri="230e9df3-be65-4c73-a93b-d1236ebd677e"/>
+  </ds:schemaRefs>
+</ds:datastoreItem>
+</file>
+
+<file path=customXml/itemProps2.xml><?xml version="1.0" encoding="utf-8"?>
+<ds:datastoreItem xmlns:ds="http://schemas.openxmlformats.org/officeDocument/2006/customXml" ds:itemID="{CABF691C-888B-4061-8A6F-D5CE84A0254B}">
+  <ds:schemaRefs>
+    <ds:schemaRef ds:uri="http://schemas.microsoft.com/sharepoint/v3/contenttype/forms"/>
   </ds:schemaRefs>
 </ds:datastoreItem>
 </file>

</xml_diff>